<commit_message>
Doc update & test plan update
</commit_message>
<xml_diff>
--- a/src/doc/spring-boot-aws.pptx
+++ b/src/doc/spring-boot-aws.pptx
@@ -319,7 +319,7 @@
             <a:fld id="{451DEABC-D766-4322-8E78-B830FAE35C72}" type="datetime4">
               <a:rPr lang="en-US" smtClean="0"/>
               <a:pPr/>
-              <a:t>novembre 2, 2015</a:t>
+              <a:t>novembre 4, 2015</a:t>
             </a:fld>
             <a:endParaRPr lang="en-US" dirty="0"/>
           </a:p>
@@ -586,7 +586,7 @@
             <a:fld id="{F3131F9E-604E-4343-9F29-EF72E8231CAD}" type="datetime4">
               <a:rPr lang="en-US" smtClean="0"/>
               <a:pPr/>
-              <a:t>novembre 2, 2015</a:t>
+              <a:t>novembre 4, 2015</a:t>
             </a:fld>
             <a:endParaRPr lang="en-US"/>
           </a:p>
@@ -763,7 +763,7 @@
             <a:fld id="{34A8E1CE-37F8-4102-8DF9-852A0A51F293}" type="datetime4">
               <a:rPr lang="en-US" smtClean="0"/>
               <a:pPr/>
-              <a:t>novembre 2, 2015</a:t>
+              <a:t>novembre 4, 2015</a:t>
             </a:fld>
             <a:endParaRPr lang="en-US"/>
           </a:p>
@@ -930,7 +930,7 @@
             <a:fld id="{93333F43-3E86-47E4-BFBB-2476D384E1C6}" type="datetime4">
               <a:rPr lang="en-US" smtClean="0"/>
               <a:pPr/>
-              <a:t>novembre 2, 2015</a:t>
+              <a:t>novembre 4, 2015</a:t>
             </a:fld>
             <a:endParaRPr lang="en-US"/>
           </a:p>
@@ -1181,7 +1181,7 @@
             <a:fld id="{751663BA-01FC-4367-B6F3-ABB2645D55F1}" type="datetime4">
               <a:rPr lang="en-US" smtClean="0"/>
               <a:pPr/>
-              <a:t>novembre 2, 2015</a:t>
+              <a:t>novembre 4, 2015</a:t>
             </a:fld>
             <a:endParaRPr lang="en-US" dirty="0"/>
           </a:p>
@@ -1466,7 +1466,7 @@
             <a:fld id="{79B19C71-EC74-44AF-B27E-FC7DC3C3A61D}" type="datetime4">
               <a:rPr lang="en-US" smtClean="0"/>
               <a:pPr/>
-              <a:t>novembre 2, 2015</a:t>
+              <a:t>novembre 4, 2015</a:t>
             </a:fld>
             <a:endParaRPr lang="en-US"/>
           </a:p>
@@ -1907,7 +1907,7 @@
             <a:fld id="{6A5CDA29-3CBE-48EA-92AE-A996835462BA}" type="datetime4">
               <a:rPr lang="en-US" smtClean="0"/>
               <a:pPr/>
-              <a:t>novembre 2, 2015</a:t>
+              <a:t>novembre 4, 2015</a:t>
             </a:fld>
             <a:endParaRPr lang="en-US"/>
           </a:p>
@@ -2022,7 +2022,7 @@
             <a:fld id="{E29EC054-3869-4501-B163-1BBFDE8DCE04}" type="datetime4">
               <a:rPr lang="en-US" smtClean="0"/>
               <a:pPr/>
-              <a:t>novembre 2, 2015</a:t>
+              <a:t>novembre 4, 2015</a:t>
             </a:fld>
             <a:endParaRPr lang="en-US"/>
           </a:p>
@@ -2114,7 +2114,7 @@
             <a:fld id="{0A63D831-56C1-49CF-8EF7-8B9A98402BCD}" type="datetime4">
               <a:rPr lang="en-US" smtClean="0"/>
               <a:pPr/>
-              <a:t>novembre 2, 2015</a:t>
+              <a:t>novembre 4, 2015</a:t>
             </a:fld>
             <a:endParaRPr lang="en-US"/>
           </a:p>
@@ -2358,7 +2358,7 @@
             <a:fld id="{6EAD5615-7F4F-4584-84D5-CC95918C321F}" type="datetime4">
               <a:rPr lang="en-US" smtClean="0"/>
               <a:pPr/>
-              <a:t>novembre 2, 2015</a:t>
+              <a:t>novembre 4, 2015</a:t>
             </a:fld>
             <a:endParaRPr lang="en-US"/>
           </a:p>
@@ -2654,7 +2654,7 @@
             <a:fld id="{76EEA923-9BEE-48CE-9F28-5B525F399BAD}" type="datetime4">
               <a:rPr lang="en-US" smtClean="0"/>
               <a:pPr/>
-              <a:t>novembre 2, 2015</a:t>
+              <a:t>novembre 4, 2015</a:t>
             </a:fld>
             <a:endParaRPr lang="en-US"/>
           </a:p>
@@ -2950,7 +2950,7 @@
             <a:fld id="{17D0EFEE-2756-4A20-BF2A-63F0A94F99AC}" type="datetime4">
               <a:rPr lang="en-US" smtClean="0"/>
               <a:pPr/>
-              <a:t>novembre 2, 2015</a:t>
+              <a:t>novembre 4, 2015</a:t>
             </a:fld>
             <a:endParaRPr lang="en-US" dirty="0"/>
           </a:p>
@@ -3840,11 +3840,7 @@
             </a:r>
             <a:r>
               <a:rPr lang="en-US" sz="1700" dirty="0" err="1" smtClean="0"/>
-              <a:t>requ</a:t>
-            </a:r>
-            <a:r>
-              <a:rPr lang="en-US" sz="1700" dirty="0" err="1" smtClean="0"/>
-              <a:t>êtes</a:t>
+              <a:t>requêtes</a:t>
             </a:r>
             <a:r>
               <a:rPr lang="en-US" sz="1700" dirty="0" smtClean="0"/>
@@ -3930,7 +3926,6 @@
               <a:rPr lang="en-US" sz="1700" dirty="0" smtClean="0"/>
               <a:t> ACID.</a:t>
             </a:r>
-            <a:endParaRPr lang="en-US" sz="1700" dirty="0" smtClean="0"/>
           </a:p>
         </p:txBody>
       </p:sp>
@@ -4653,15 +4648,7 @@
             </a:r>
             <a:r>
               <a:rPr lang="en-US" i="1" dirty="0"/>
-              <a:t>@Profile</a:t>
-            </a:r>
-            <a:r>
-              <a:rPr lang="en-US" i="1" dirty="0"/>
-              <a:t>(</a:t>
-            </a:r>
-            <a:r>
-              <a:rPr lang="en-US" i="1" dirty="0"/>
-              <a:t>"</a:t>
+              <a:t>@Profile("</a:t>
             </a:r>
             <a:r>
               <a:rPr lang="en-US" i="1" dirty="0" err="1"/>
@@ -4912,11 +4899,7 @@
             </a:r>
             <a:r>
               <a:rPr lang="en-US" i="1" dirty="0"/>
-              <a:t>(</a:t>
-            </a:r>
-            <a:r>
-              <a:rPr lang="en-US" i="1" dirty="0"/>
-              <a:t>"</a:t>
+              <a:t>("</a:t>
             </a:r>
             <a:r>
               <a:rPr lang="en-US" i="1" dirty="0" err="1"/>
@@ -5211,11 +5194,7 @@
             </a:br>
             <a:r>
               <a:rPr lang="en-US" b="0" dirty="0"/>
-              <a:t>        </a:t>
-            </a:r>
-            <a:r>
-              <a:rPr lang="en-US" b="0" dirty="0"/>
-              <a:t>@Override</a:t>
+              <a:t>        @Override</a:t>
             </a:r>
             <a:br>
               <a:rPr lang="en-US" b="0" dirty="0"/>
@@ -6069,11 +6048,7 @@
             </a:r>
             <a:r>
               <a:rPr lang="en-US" dirty="0"/>
-              <a:t>=</a:t>
-            </a:r>
-            <a:r>
-              <a:rPr lang="en-US" dirty="0"/>
-              <a:t>${RABBIT_HOST}</a:t>
+              <a:t>=${RABBIT_HOST}</a:t>
             </a:r>
             <a:br>
               <a:rPr lang="en-US" dirty="0"/>
@@ -6084,11 +6059,7 @@
             </a:r>
             <a:r>
               <a:rPr lang="en-US" dirty="0"/>
-              <a:t>=</a:t>
-            </a:r>
-            <a:r>
-              <a:rPr lang="en-US" dirty="0"/>
-              <a:t>5672</a:t>
+              <a:t>=5672</a:t>
             </a:r>
             <a:br>
               <a:rPr lang="en-US" dirty="0"/>
@@ -6099,11 +6070,7 @@
             </a:r>
             <a:r>
               <a:rPr lang="en-US" dirty="0"/>
-              <a:t>=</a:t>
-            </a:r>
-            <a:r>
-              <a:rPr lang="en-US" dirty="0"/>
-              <a:t>${RABBIT_USERNAME}</a:t>
+              <a:t>=${RABBIT_USERNAME}</a:t>
             </a:r>
             <a:br>
               <a:rPr lang="en-US" dirty="0"/>
@@ -6114,11 +6081,7 @@
             </a:r>
             <a:r>
               <a:rPr lang="en-US" dirty="0"/>
-              <a:t>=</a:t>
-            </a:r>
-            <a:r>
-              <a:rPr lang="en-US" dirty="0"/>
-              <a:t>${RABBIT_PASSWORD}</a:t>
+              <a:t>=${RABBIT_PASSWORD}</a:t>
             </a:r>
             <a:br>
               <a:rPr lang="en-US" dirty="0"/>
@@ -6129,11 +6092,7 @@
             </a:r>
             <a:r>
               <a:rPr lang="en-US" dirty="0"/>
-              <a:t>=</a:t>
-            </a:r>
-            <a:r>
-              <a:rPr lang="en-US" dirty="0"/>
-              <a:t>1</a:t>
+              <a:t>=1</a:t>
             </a:r>
             <a:br>
               <a:rPr lang="en-US" dirty="0"/>
@@ -6288,11 +6247,7 @@
             </a:r>
             <a:r>
               <a:rPr lang="en-US" dirty="0" smtClean="0"/>
-              <a:t> </a:t>
-            </a:r>
-            <a:r>
-              <a:rPr lang="en-US" dirty="0" smtClean="0"/>
-              <a:t>datacenter</a:t>
+              <a:t> datacenter</a:t>
             </a:r>
             <a:br>
               <a:rPr lang="en-US" dirty="0" smtClean="0"/>
@@ -6680,19 +6635,7 @@
             </a:pPr>
             <a:r>
               <a:rPr lang="en-US" b="0" dirty="0" smtClean="0"/>
-              <a:t>Web </a:t>
-            </a:r>
-            <a:r>
-              <a:rPr lang="en-US" b="0" dirty="0" smtClean="0"/>
-              <a:t>application </a:t>
-            </a:r>
-            <a:r>
-              <a:rPr lang="en-US" b="0" dirty="0" smtClean="0"/>
-              <a:t>(Java Spring </a:t>
-            </a:r>
-            <a:r>
-              <a:rPr lang="en-US" b="0" dirty="0" smtClean="0"/>
-              <a:t>Boot)</a:t>
+              <a:t>Web application (Java Spring Boot)</a:t>
             </a:r>
           </a:p>
           <a:p>
@@ -6807,7 +6750,6 @@
               <a:rPr lang="en-US" b="0" dirty="0" smtClean="0"/>
               <a:t>Load balancing &amp; failover</a:t>
             </a:r>
-            <a:endParaRPr lang="en-US" b="0" dirty="0" smtClean="0"/>
           </a:p>
         </p:txBody>
       </p:sp>
@@ -6881,7 +6823,7 @@
         <p:spPr/>
         <p:txBody>
           <a:bodyPr>
-            <a:normAutofit lnSpcReduction="10000"/>
+            <a:normAutofit fontScale="92500" lnSpcReduction="20000"/>
           </a:bodyPr>
           <a:lstStyle/>
           <a:p>
@@ -6899,11 +6841,7 @@
             </a:r>
             <a:r>
               <a:rPr lang="en-US" dirty="0" err="1" smtClean="0"/>
-              <a:t>syst</a:t>
-            </a:r>
-            <a:r>
-              <a:rPr lang="en-US" dirty="0" err="1" smtClean="0"/>
-              <a:t>èmes</a:t>
+              <a:t>systèmes</a:t>
             </a:r>
             <a:r>
               <a:rPr lang="en-US" dirty="0" smtClean="0"/>
@@ -6971,8 +6909,16 @@
               <a:buChar char="•"/>
             </a:pPr>
             <a:r>
-              <a:rPr lang="en-US" dirty="0" smtClean="0"/>
-              <a:t>EC3 : service de </a:t>
+              <a:rPr lang="en-US" dirty="0"/>
+              <a:t>S</a:t>
+            </a:r>
+            <a:r>
+              <a:rPr lang="en-US" dirty="0" smtClean="0"/>
+              <a:t>3 </a:t>
+            </a:r>
+            <a:r>
+              <a:rPr lang="en-US" dirty="0" smtClean="0"/>
+              <a:t>: service de </a:t>
             </a:r>
             <a:r>
               <a:rPr lang="en-US" dirty="0" err="1" smtClean="0"/>
@@ -7027,46 +6973,12 @@
             </a:r>
             <a:r>
               <a:rPr lang="en-US" dirty="0" smtClean="0"/>
-              <a:t> le cloud</a:t>
-            </a:r>
-          </a:p>
-          <a:p>
-            <a:endParaRPr lang="en-US" dirty="0" smtClean="0"/>
-          </a:p>
-          <a:p>
-            <a:r>
-              <a:rPr lang="en-US" dirty="0" smtClean="0"/>
-              <a:t>Il </a:t>
-            </a:r>
-            <a:r>
-              <a:rPr lang="en-US" dirty="0" err="1" smtClean="0"/>
-              <a:t>fournit</a:t>
-            </a:r>
-            <a:r>
-              <a:rPr lang="en-US" dirty="0" smtClean="0"/>
-              <a:t> </a:t>
-            </a:r>
-            <a:r>
-              <a:rPr lang="en-US" dirty="0" err="1" smtClean="0"/>
-              <a:t>également</a:t>
-            </a:r>
-            <a:r>
-              <a:rPr lang="en-US" dirty="0" smtClean="0"/>
-              <a:t> les services </a:t>
-            </a:r>
-            <a:r>
-              <a:rPr lang="en-US" dirty="0" err="1" smtClean="0"/>
-              <a:t>d’infrastructures</a:t>
-            </a:r>
-            <a:r>
-              <a:rPr lang="en-US" dirty="0" smtClean="0"/>
-              <a:t> </a:t>
-            </a:r>
-            <a:r>
-              <a:rPr lang="en-US" dirty="0" err="1" smtClean="0"/>
-              <a:t>suivantes</a:t>
-            </a:r>
-            <a:endParaRPr lang="en-US" dirty="0" smtClean="0"/>
+              <a:t> le </a:t>
+            </a:r>
+            <a:r>
+              <a:rPr lang="en-US" dirty="0" smtClean="0"/>
+              <a:t>cloud</a:t>
+            </a:r>
           </a:p>
           <a:p>
             <a:pPr marL="342900" indent="-342900">
@@ -7075,11 +6987,11 @@
             </a:pPr>
             <a:r>
               <a:rPr lang="en-US" dirty="0" smtClean="0"/>
-              <a:t>VPC : Virtual Private Cloud, </a:t>
-            </a:r>
-            <a:r>
-              <a:rPr lang="en-US" dirty="0" err="1" smtClean="0"/>
-              <a:t>réseau</a:t>
+              <a:t>Beanstalk : service simple de </a:t>
+            </a:r>
+            <a:r>
+              <a:rPr lang="en-US" dirty="0" err="1" smtClean="0"/>
+              <a:t>déploiement</a:t>
             </a:r>
             <a:r>
               <a:rPr lang="en-US" dirty="0" smtClean="0"/>
@@ -7087,39 +6999,45 @@
             </a:r>
             <a:r>
               <a:rPr lang="en-US" dirty="0" err="1" smtClean="0"/>
-              <a:t>privé</a:t>
-            </a:r>
-            <a:r>
-              <a:rPr lang="en-US" dirty="0" smtClean="0"/>
-              <a:t> pour </a:t>
-            </a:r>
-            <a:r>
-              <a:rPr lang="en-US" dirty="0" err="1" smtClean="0"/>
-              <a:t>interconnecter</a:t>
-            </a:r>
-            <a:r>
-              <a:rPr lang="en-US" dirty="0" smtClean="0"/>
-              <a:t> les services amazon “VPN </a:t>
-            </a:r>
-            <a:r>
-              <a:rPr lang="en-US" dirty="0" err="1" smtClean="0"/>
-              <a:t>dans</a:t>
-            </a:r>
-            <a:r>
-              <a:rPr lang="en-US" dirty="0" smtClean="0"/>
-              <a:t> le cloud”. </a:t>
-            </a:r>
-            <a:r>
-              <a:rPr lang="en-US" dirty="0" err="1" smtClean="0"/>
-              <a:t>Hébergement</a:t>
-            </a:r>
-            <a:r>
-              <a:rPr lang="en-US" dirty="0" smtClean="0"/>
-              <a:t> multi-</a:t>
-            </a:r>
-            <a:r>
-              <a:rPr lang="en-US" dirty="0" err="1" smtClean="0"/>
-              <a:t>niveaux</a:t>
+              <a:t>d’applications</a:t>
+            </a:r>
+            <a:endParaRPr lang="en-US" dirty="0" smtClean="0"/>
+          </a:p>
+          <a:p>
+            <a:endParaRPr lang="en-US" dirty="0" smtClean="0"/>
+          </a:p>
+          <a:p>
+            <a:r>
+              <a:rPr lang="en-US" dirty="0" smtClean="0"/>
+              <a:t>Il </a:t>
+            </a:r>
+            <a:r>
+              <a:rPr lang="en-US" dirty="0" err="1" smtClean="0"/>
+              <a:t>fournit</a:t>
+            </a:r>
+            <a:r>
+              <a:rPr lang="en-US" dirty="0" smtClean="0"/>
+              <a:t> </a:t>
+            </a:r>
+            <a:r>
+              <a:rPr lang="en-US" dirty="0" err="1" smtClean="0"/>
+              <a:t>également</a:t>
+            </a:r>
+            <a:r>
+              <a:rPr lang="en-US" dirty="0" smtClean="0"/>
+              <a:t> les services </a:t>
+            </a:r>
+            <a:r>
+              <a:rPr lang="en-US" dirty="0" err="1" smtClean="0"/>
+              <a:t>d’infrastructures</a:t>
+            </a:r>
+            <a:r>
+              <a:rPr lang="en-US" dirty="0" smtClean="0"/>
+              <a:t> </a:t>
+            </a:r>
+            <a:r>
+              <a:rPr lang="en-US" dirty="0" err="1" smtClean="0"/>
+              <a:t>suivantes</a:t>
             </a:r>
             <a:endParaRPr lang="en-US" dirty="0" smtClean="0"/>
           </a:p>
@@ -7130,6 +7048,61 @@
             </a:pPr>
             <a:r>
               <a:rPr lang="en-US" dirty="0" smtClean="0"/>
+              <a:t>VPC : Virtual Private Cloud, </a:t>
+            </a:r>
+            <a:r>
+              <a:rPr lang="en-US" dirty="0" err="1" smtClean="0"/>
+              <a:t>réseau</a:t>
+            </a:r>
+            <a:r>
+              <a:rPr lang="en-US" dirty="0" smtClean="0"/>
+              <a:t> </a:t>
+            </a:r>
+            <a:r>
+              <a:rPr lang="en-US" dirty="0" err="1" smtClean="0"/>
+              <a:t>privé</a:t>
+            </a:r>
+            <a:r>
+              <a:rPr lang="en-US" dirty="0" smtClean="0"/>
+              <a:t> pour </a:t>
+            </a:r>
+            <a:r>
+              <a:rPr lang="en-US" dirty="0" err="1" smtClean="0"/>
+              <a:t>interconnecter</a:t>
+            </a:r>
+            <a:r>
+              <a:rPr lang="en-US" dirty="0" smtClean="0"/>
+              <a:t> les services amazon “VPN </a:t>
+            </a:r>
+            <a:r>
+              <a:rPr lang="en-US" dirty="0" err="1" smtClean="0"/>
+              <a:t>dans</a:t>
+            </a:r>
+            <a:r>
+              <a:rPr lang="en-US" dirty="0" smtClean="0"/>
+              <a:t> le cloud”. </a:t>
+            </a:r>
+            <a:r>
+              <a:rPr lang="en-US" dirty="0" err="1" smtClean="0"/>
+              <a:t>Hébergement</a:t>
+            </a:r>
+            <a:r>
+              <a:rPr lang="en-US" dirty="0" smtClean="0"/>
+              <a:t> multi-</a:t>
+            </a:r>
+            <a:r>
+              <a:rPr lang="en-US" dirty="0" err="1" smtClean="0"/>
+              <a:t>niveaux</a:t>
+            </a:r>
+            <a:endParaRPr lang="en-US" dirty="0" smtClean="0"/>
+          </a:p>
+          <a:p>
+            <a:pPr marL="342900" indent="-342900">
+              <a:buFont typeface="Arial"/>
+              <a:buChar char="•"/>
+            </a:pPr>
+            <a:r>
+              <a:rPr lang="en-US" dirty="0" smtClean="0"/>
               <a:t>Security Groups : </a:t>
             </a:r>
             <a:r>
@@ -7142,11 +7115,7 @@
             </a:r>
             <a:r>
               <a:rPr lang="en-US" dirty="0" err="1" smtClean="0"/>
-              <a:t>sécurit</a:t>
-            </a:r>
-            <a:r>
-              <a:rPr lang="en-US" dirty="0" err="1" smtClean="0"/>
-              <a:t>é</a:t>
+              <a:t>sécurité</a:t>
             </a:r>
             <a:r>
               <a:rPr lang="en-US" dirty="0" smtClean="0"/>
@@ -7286,7 +7255,6 @@
               <a:rPr lang="en-US" b="0" dirty="0" smtClean="0"/>
               <a:t> Cloud Foundry? </a:t>
             </a:r>
-            <a:endParaRPr lang="en-US" b="0" dirty="0" smtClean="0"/>
           </a:p>
           <a:p>
             <a:endParaRPr lang="en-US" b="0" dirty="0"/>

</xml_diff>